<commit_message>
Addition  new testing methods based on new models
</commit_message>
<xml_diff>
--- a/Présentation de slides.pptx
+++ b/Présentation de slides.pptx
@@ -129,16 +129,78 @@
 </p:presentation>
 </file>
 
-<file path=ppt/revisionInfo.xml><?xml version="1.0" encoding="utf-8"?>
-<p1510:revInfo xmlns:a="http://schemas.openxmlformats.org/drawingml/2006/main" xmlns:r="http://schemas.openxmlformats.org/officeDocument/2006/relationships" xmlns:p1510="http://schemas.microsoft.com/office/powerpoint/2015/10/main">
-  <p1510:revLst>
-    <p1510:client id="{AAA4E363-0649-4C99-ADC8-55A77C4D773F}" v="79" dt="2023-08-18T10:20:43.182"/>
-  </p1510:revLst>
-</p1510:revInfo>
-</file>
-
 <file path=ppt/changesInfos/changesInfo1.xml><?xml version="1.0" encoding="utf-8"?>
 <pc:chgInfo xmlns:a="http://schemas.openxmlformats.org/drawingml/2006/main" xmlns:r="http://schemas.openxmlformats.org/officeDocument/2006/relationships" xmlns:ac="http://schemas.microsoft.com/office/drawing/2013/main/command" xmlns:pc="http://schemas.microsoft.com/office/powerpoint/2013/main/command">
+  <pc:docChgLst>
+    <pc:chgData name="Quentin Beraud" userId="6a419fc9c26811ab" providerId="LiveId" clId="{3F3CC9DC-DBBB-44EF-8315-E9D08EE2DA56}"/>
+    <pc:docChg chg="custSel modSld">
+      <pc:chgData name="Quentin Beraud" userId="6a419fc9c26811ab" providerId="LiveId" clId="{3F3CC9DC-DBBB-44EF-8315-E9D08EE2DA56}" dt="2023-09-07T08:55:38.687" v="58" actId="12"/>
+      <pc:docMkLst>
+        <pc:docMk/>
+      </pc:docMkLst>
+      <pc:sldChg chg="modSp mod">
+        <pc:chgData name="Quentin Beraud" userId="6a419fc9c26811ab" providerId="LiveId" clId="{3F3CC9DC-DBBB-44EF-8315-E9D08EE2DA56}" dt="2023-09-07T08:55:38.687" v="58" actId="12"/>
+        <pc:sldMkLst>
+          <pc:docMk/>
+          <pc:sldMk cId="2249982744" sldId="307"/>
+        </pc:sldMkLst>
+        <pc:spChg chg="mod">
+          <ac:chgData name="Quentin Beraud" userId="6a419fc9c26811ab" providerId="LiveId" clId="{3F3CC9DC-DBBB-44EF-8315-E9D08EE2DA56}" dt="2023-09-07T08:55:38.687" v="58" actId="12"/>
+          <ac:spMkLst>
+            <pc:docMk/>
+            <pc:sldMk cId="2249982744" sldId="307"/>
+            <ac:spMk id="5" creationId="{CEEB3BAE-C0B2-447C-B8BE-96C6BD84D658}"/>
+          </ac:spMkLst>
+        </pc:spChg>
+      </pc:sldChg>
+      <pc:sldChg chg="addSp delSp modSp mod">
+        <pc:chgData name="Quentin Beraud" userId="6a419fc9c26811ab" providerId="LiveId" clId="{3F3CC9DC-DBBB-44EF-8315-E9D08EE2DA56}" dt="2023-09-07T08:29:47.422" v="5" actId="167"/>
+        <pc:sldMkLst>
+          <pc:docMk/>
+          <pc:sldMk cId="271191972" sldId="319"/>
+        </pc:sldMkLst>
+        <pc:picChg chg="add mod ord">
+          <ac:chgData name="Quentin Beraud" userId="6a419fc9c26811ab" providerId="LiveId" clId="{3F3CC9DC-DBBB-44EF-8315-E9D08EE2DA56}" dt="2023-09-07T08:29:47.422" v="5" actId="167"/>
+          <ac:picMkLst>
+            <pc:docMk/>
+            <pc:sldMk cId="271191972" sldId="319"/>
+            <ac:picMk id="6" creationId="{9E4816F4-BE45-F773-71E1-026C145CABB5}"/>
+          </ac:picMkLst>
+        </pc:picChg>
+        <pc:picChg chg="del">
+          <ac:chgData name="Quentin Beraud" userId="6a419fc9c26811ab" providerId="LiveId" clId="{3F3CC9DC-DBBB-44EF-8315-E9D08EE2DA56}" dt="2023-09-07T08:22:59.246" v="0" actId="478"/>
+          <ac:picMkLst>
+            <pc:docMk/>
+            <pc:sldMk cId="271191972" sldId="319"/>
+            <ac:picMk id="16" creationId="{729BC831-2D2F-69C0-8E64-FE4DB1121588}"/>
+          </ac:picMkLst>
+        </pc:picChg>
+      </pc:sldChg>
+      <pc:sldChg chg="addSp delSp modSp mod">
+        <pc:chgData name="Quentin Beraud" userId="6a419fc9c26811ab" providerId="LiveId" clId="{3F3CC9DC-DBBB-44EF-8315-E9D08EE2DA56}" dt="2023-09-07T08:30:17.830" v="10" actId="1076"/>
+        <pc:sldMkLst>
+          <pc:docMk/>
+          <pc:sldMk cId="4078171086" sldId="320"/>
+        </pc:sldMkLst>
+        <pc:picChg chg="add mod ord">
+          <ac:chgData name="Quentin Beraud" userId="6a419fc9c26811ab" providerId="LiveId" clId="{3F3CC9DC-DBBB-44EF-8315-E9D08EE2DA56}" dt="2023-09-07T08:30:17.830" v="10" actId="1076"/>
+          <ac:picMkLst>
+            <pc:docMk/>
+            <pc:sldMk cId="4078171086" sldId="320"/>
+            <ac:picMk id="6" creationId="{6AA1F80F-0FC7-EA78-2BD8-45844F6FFAAA}"/>
+          </ac:picMkLst>
+        </pc:picChg>
+        <pc:picChg chg="del">
+          <ac:chgData name="Quentin Beraud" userId="6a419fc9c26811ab" providerId="LiveId" clId="{3F3CC9DC-DBBB-44EF-8315-E9D08EE2DA56}" dt="2023-09-07T08:23:01.854" v="1" actId="478"/>
+          <ac:picMkLst>
+            <pc:docMk/>
+            <pc:sldMk cId="4078171086" sldId="320"/>
+            <ac:picMk id="12" creationId="{BA9ED0F3-500E-18E1-CE8F-0D071C1E1D90}"/>
+          </ac:picMkLst>
+        </pc:picChg>
+      </pc:sldChg>
+    </pc:docChg>
+  </pc:docChgLst>
   <pc:docChgLst>
     <pc:chgData name="Quentin Beraud" userId="6a419fc9c26811ab" providerId="LiveId" clId="{AAA4E363-0649-4C99-ADC8-55A77C4D773F}"/>
     <pc:docChg chg="undo redo custSel addSld delSld modSld">
@@ -4669,7 +4731,7 @@
             <a:pPr rtl="0"/>
             <a:fld id="{EBB651C5-239C-481D-B679-C1853F3D7869}" type="datetime1">
               <a:rPr lang="fr-FR" smtClean="0"/>
-              <a:t>18/08/2023</a:t>
+              <a:t>07/09/2023</a:t>
             </a:fld>
             <a:endParaRPr lang="fr-FR" dirty="0"/>
           </a:p>
@@ -4850,7 +4912,7 @@
             <a:fld id="{0CC3F468-A24C-40BA-9BA0-927B9D8CEF08}" type="datetime1">
               <a:rPr lang="fr-FR" smtClean="0"/>
               <a:pPr/>
-              <a:t>18/08/2023</a:t>
+              <a:t>07/09/2023</a:t>
             </a:fld>
             <a:endParaRPr lang="fr-FR" dirty="0"/>
           </a:p>
@@ -14447,7 +14509,7 @@
               <a:buNone/>
             </a:pPr>
             <a:r>
-              <a:rPr lang="fr-FR" sz="1800" dirty="0"/>
+              <a:rPr lang="fr-FR" dirty="0"/>
               <a:t>Création des modèles correspondants aux objets recherchés :</a:t>
             </a:r>
           </a:p>
@@ -14479,11 +14541,19 @@
             </a:r>
             <a:r>
               <a:rPr lang="fr-FR" sz="1600" dirty="0"/>
-              <a:t> &amp; </a:t>
+              <a:t>, </a:t>
             </a:r>
             <a:r>
               <a:rPr lang="fr-FR" sz="1600" dirty="0" err="1"/>
               <a:t>MedicalRecord</a:t>
+            </a:r>
+            <a:r>
+              <a:rPr lang="fr-FR" sz="1600" dirty="0"/>
+              <a:t> et </a:t>
+            </a:r>
+            <a:r>
+              <a:rPr lang="fr-FR" sz="1600" dirty="0" err="1"/>
+              <a:t>Households</a:t>
             </a:r>
             <a:r>
               <a:rPr lang="fr-FR" sz="1600" dirty="0"/>
@@ -14529,8 +14599,8 @@
               <a:buNone/>
             </a:pPr>
             <a:r>
-              <a:rPr lang="fr-FR" sz="1800" dirty="0"/>
-              <a:t>Création des Contrôleurs pour les interactions utilisateurs via les différents Endpoints.</a:t>
+              <a:rPr lang="fr-FR" dirty="0"/>
+              <a:t>Création des Contrôleurs pour les futures interactions utilisateurs via les différents Endpoints.</a:t>
             </a:r>
           </a:p>
           <a:p>
@@ -14541,7 +14611,7 @@
               <a:buNone/>
             </a:pPr>
             <a:r>
-              <a:rPr lang="fr-FR" sz="1800" dirty="0"/>
+              <a:rPr lang="fr-FR" dirty="0"/>
               <a:t>Création des Services pour la logique métiers.</a:t>
             </a:r>
           </a:p>
@@ -14553,7 +14623,7 @@
               <a:buNone/>
             </a:pPr>
             <a:r>
-              <a:rPr lang="fr-FR" sz="1800" dirty="0"/>
+              <a:rPr lang="fr-FR" dirty="0"/>
               <a:t>Création de la Dao pour l’accès aux données.</a:t>
             </a:r>
           </a:p>
@@ -14565,16 +14635,15 @@
               <a:buNone/>
             </a:pPr>
             <a:r>
-              <a:rPr lang="fr-FR" dirty="0"/>
+              <a:rPr lang="fr-FR" sz="1800" dirty="0"/>
               <a:t>Tout en respectant au maximum les principes du TDD et SOLID  tels que :</a:t>
             </a:r>
           </a:p>
           <a:p>
-            <a:pPr marL="360000" lvl="1" indent="0">
+            <a:pPr marL="645750" lvl="1" indent="-285750">
               <a:spcAft>
                 <a:spcPts val="500"/>
               </a:spcAft>
-              <a:buNone/>
             </a:pPr>
             <a:r>
               <a:rPr lang="fr-FR" dirty="0"/>
@@ -14582,11 +14651,10 @@
             </a:r>
           </a:p>
           <a:p>
-            <a:pPr marL="360000" lvl="1" indent="0">
+            <a:pPr marL="645750" lvl="1" indent="-285750">
               <a:spcAft>
                 <a:spcPts val="500"/>
               </a:spcAft>
-              <a:buNone/>
             </a:pPr>
             <a:r>
               <a:rPr lang="fr-FR" dirty="0"/>
@@ -14594,11 +14662,10 @@
             </a:r>
           </a:p>
           <a:p>
-            <a:pPr marL="360000" lvl="1" indent="0">
+            <a:pPr marL="645750" lvl="1" indent="-285750">
               <a:spcAft>
                 <a:spcPts val="500"/>
               </a:spcAft>
-              <a:buNone/>
             </a:pPr>
             <a:r>
               <a:rPr lang="fr-FR" dirty="0"/>
@@ -14611,11 +14678,10 @@
             <a:endParaRPr lang="fr-FR" dirty="0"/>
           </a:p>
           <a:p>
-            <a:pPr marL="360000" lvl="1" indent="0">
+            <a:pPr marL="645750" lvl="1" indent="-285750">
               <a:spcAft>
                 <a:spcPts val="500"/>
               </a:spcAft>
-              <a:buNone/>
             </a:pPr>
             <a:r>
               <a:rPr lang="fr-FR" dirty="0"/>
@@ -14623,11 +14689,10 @@
             </a:r>
           </a:p>
           <a:p>
-            <a:pPr marL="360000" lvl="1" indent="0">
+            <a:pPr marL="645750" lvl="1" indent="-285750">
               <a:spcAft>
                 <a:spcPts val="500"/>
               </a:spcAft>
-              <a:buNone/>
             </a:pPr>
             <a:r>
               <a:rPr lang="fr-FR" dirty="0"/>
@@ -15214,6 +15279,36 @@
           <a:chExt cx="0" cy="0"/>
         </a:xfrm>
       </p:grpSpPr>
+      <p:pic>
+        <p:nvPicPr>
+          <p:cNvPr id="6" name="Image 5">
+            <a:extLst>
+              <a:ext uri="{FF2B5EF4-FFF2-40B4-BE49-F238E27FC236}">
+                <a16:creationId xmlns:a16="http://schemas.microsoft.com/office/drawing/2014/main" id="{9E4816F4-BE45-F773-71E1-026C145CABB5}"/>
+              </a:ext>
+            </a:extLst>
+          </p:cNvPr>
+          <p:cNvPicPr>
+            <a:picLocks noChangeAspect="1"/>
+          </p:cNvPicPr>
+          <p:nvPr/>
+        </p:nvPicPr>
+        <p:blipFill>
+          <a:blip r:embed="rId3"/>
+          <a:stretch>
+            <a:fillRect/>
+          </a:stretch>
+        </p:blipFill>
+        <p:spPr>
+          <a:xfrm>
+            <a:off x="579037" y="990140"/>
+            <a:ext cx="10386223" cy="5381208"/>
+          </a:xfrm>
+          <a:prstGeom prst="rect">
+            <a:avLst/>
+          </a:prstGeom>
+        </p:spPr>
+      </p:pic>
       <p:cxnSp>
         <p:nvCxnSpPr>
           <p:cNvPr id="11" name="Connecteur droit 10" descr="Séparateur de diapositive">
@@ -15476,7 +15571,7 @@
           <p:nvPr/>
         </p:nvPicPr>
         <p:blipFill rotWithShape="1">
-          <a:blip r:embed="rId3">
+          <a:blip r:embed="rId4">
             <a:extLst>
               <a:ext uri="{28A0092B-C50C-407E-A947-70E740481C1C}">
                 <a14:useLocalDpi xmlns:a14="http://schemas.microsoft.com/office/drawing/2010/main" val="0"/>
@@ -15521,7 +15616,7 @@
           <p:nvPr/>
         </p:nvPicPr>
         <p:blipFill rotWithShape="1">
-          <a:blip r:embed="rId3">
+          <a:blip r:embed="rId4">
             <a:extLst>
               <a:ext uri="{28A0092B-C50C-407E-A947-70E740481C1C}">
                 <a14:useLocalDpi xmlns:a14="http://schemas.microsoft.com/office/drawing/2010/main" val="0"/>
@@ -15549,36 +15644,6 @@
               </a14:hiddenFill>
             </a:ext>
           </a:extLst>
-        </p:spPr>
-      </p:pic>
-      <p:pic>
-        <p:nvPicPr>
-          <p:cNvPr id="16" name="Image 15" descr="Une image contenant diagramme, croquis, texte, dessin&#10;&#10;Description générée automatiquement">
-            <a:extLst>
-              <a:ext uri="{FF2B5EF4-FFF2-40B4-BE49-F238E27FC236}">
-                <a16:creationId xmlns:a16="http://schemas.microsoft.com/office/drawing/2014/main" id="{729BC831-2D2F-69C0-8E64-FE4DB1121588}"/>
-              </a:ext>
-            </a:extLst>
-          </p:cNvPr>
-          <p:cNvPicPr>
-            <a:picLocks noChangeAspect="1"/>
-          </p:cNvPicPr>
-          <p:nvPr/>
-        </p:nvPicPr>
-        <p:blipFill>
-          <a:blip r:embed="rId4"/>
-          <a:stretch>
-            <a:fillRect/>
-          </a:stretch>
-        </p:blipFill>
-        <p:spPr>
-          <a:xfrm>
-            <a:off x="456023" y="1249328"/>
-            <a:ext cx="11315700" cy="4724400"/>
-          </a:xfrm>
-          <a:prstGeom prst="rect">
-            <a:avLst/>
-          </a:prstGeom>
         </p:spPr>
       </p:pic>
     </p:spTree>
@@ -15613,10 +15678,10 @@
       </p:grpSpPr>
       <p:pic>
         <p:nvPicPr>
-          <p:cNvPr id="12" name="Image 11" descr="Une image contenant texte, diagramme, Parallèle, Police&#10;&#10;Description générée automatiquement">
+          <p:cNvPr id="6" name="Image 5">
             <a:extLst>
               <a:ext uri="{FF2B5EF4-FFF2-40B4-BE49-F238E27FC236}">
-                <a16:creationId xmlns:a16="http://schemas.microsoft.com/office/drawing/2014/main" id="{BA9ED0F3-500E-18E1-CE8F-0D071C1E1D90}"/>
+                <a16:creationId xmlns:a16="http://schemas.microsoft.com/office/drawing/2014/main" id="{6AA1F80F-0FC7-EA78-2BD8-45844F6FFAAA}"/>
               </a:ext>
             </a:extLst>
           </p:cNvPr>
@@ -15633,8 +15698,8 @@
         </p:blipFill>
         <p:spPr>
           <a:xfrm>
-            <a:off x="1239714" y="7045"/>
-            <a:ext cx="9785888" cy="6364303"/>
+            <a:off x="2857360" y="266808"/>
+            <a:ext cx="6477280" cy="5858290"/>
           </a:xfrm>
           <a:prstGeom prst="rect">
             <a:avLst/>
@@ -18474,6 +18539,15 @@
 </file>
 
 <file path=customXml/item1.xml><?xml version="1.0" encoding="utf-8"?>
+<p:properties xmlns:p="http://schemas.microsoft.com/office/2006/metadata/properties" xmlns:xsi="http://www.w3.org/2001/XMLSchema-instance" xmlns:pc="http://schemas.microsoft.com/office/infopath/2007/PartnerControls">
+  <documentManagement>
+    <_ip_UnifiedCompliancePolicyUIAction xmlns="http://schemas.microsoft.com/sharepoint/v3" xsi:nil="true"/>
+    <_ip_UnifiedCompliancePolicyProperties xmlns="http://schemas.microsoft.com/sharepoint/v3" xsi:nil="true"/>
+  </documentManagement>
+</p:properties>
+</file>
+
+<file path=customXml/item2.xml><?xml version="1.0" encoding="utf-8"?>
 <ct:contentTypeSchema xmlns:ct="http://schemas.microsoft.com/office/2006/metadata/contentType" xmlns:ma="http://schemas.microsoft.com/office/2006/metadata/properties/metaAttributes" ct:_="" ma:_="" ma:contentTypeName="Document" ma:contentTypeID="0x010100DEEA25CC0A0AC24199CDC46C25B8B0BC" ma:contentTypeVersion="9" ma:contentTypeDescription="Create a new document." ma:contentTypeScope="" ma:versionID="76e25e1730b4532ab1d5e5b131a96a5a">
   <xsd:schema xmlns:xsd="http://www.w3.org/2001/XMLSchema" xmlns:xs="http://www.w3.org/2001/XMLSchema" xmlns:p="http://schemas.microsoft.com/office/2006/metadata/properties" xmlns:ns1="http://schemas.microsoft.com/sharepoint/v3" xmlns:ns2="6dc4bcd6-49db-4c07-9060-8acfc67cef9f" xmlns:ns3="fb0879af-3eba-417a-a55a-ffe6dcd6ca77" targetNamespace="http://schemas.microsoft.com/office/2006/metadata/properties" ma:root="true" ma:fieldsID="ad1e9281a84c4949647088091c718de3" ns1:_="" ns2:_="" ns3:_="">
     <xsd:import namespace="http://schemas.microsoft.com/sharepoint/v3"/>
@@ -18675,16 +18749,25 @@
 </ct:contentTypeSchema>
 </file>
 
-<file path=customXml/item2.xml><?xml version="1.0" encoding="utf-8"?>
-<p:properties xmlns:p="http://schemas.microsoft.com/office/2006/metadata/properties" xmlns:xsi="http://www.w3.org/2001/XMLSchema-instance" xmlns:pc="http://schemas.microsoft.com/office/infopath/2007/PartnerControls">
-  <documentManagement>
-    <_ip_UnifiedCompliancePolicyUIAction xmlns="http://schemas.microsoft.com/sharepoint/v3" xsi:nil="true"/>
-    <_ip_UnifiedCompliancePolicyProperties xmlns="http://schemas.microsoft.com/sharepoint/v3" xsi:nil="true"/>
-  </documentManagement>
-</p:properties>
+<file path=customXml/itemProps1.xml><?xml version="1.0" encoding="utf-8"?>
+<ds:datastoreItem xmlns:ds="http://schemas.openxmlformats.org/officeDocument/2006/customXml" ds:itemID="{EB2218FC-8412-44B9-9E82-D51F1F531141}">
+  <ds:schemaRefs>
+    <ds:schemaRef ds:uri="http://purl.org/dc/dcmitype/"/>
+    <ds:schemaRef ds:uri="6dc4bcd6-49db-4c07-9060-8acfc67cef9f"/>
+    <ds:schemaRef ds:uri="http://schemas.microsoft.com/office/2006/metadata/properties"/>
+    <ds:schemaRef ds:uri="http://schemas.microsoft.com/office/2006/documentManagement/types"/>
+    <ds:schemaRef ds:uri="http://schemas.microsoft.com/sharepoint/v3"/>
+    <ds:schemaRef ds:uri="http://www.w3.org/XML/1998/namespace"/>
+    <ds:schemaRef ds:uri="http://schemas.microsoft.com/office/infopath/2007/PartnerControls"/>
+    <ds:schemaRef ds:uri="http://purl.org/dc/elements/1.1/"/>
+    <ds:schemaRef ds:uri="http://schemas.openxmlformats.org/package/2006/metadata/core-properties"/>
+    <ds:schemaRef ds:uri="fb0879af-3eba-417a-a55a-ffe6dcd6ca77"/>
+    <ds:schemaRef ds:uri="http://purl.org/dc/terms/"/>
+  </ds:schemaRefs>
+</ds:datastoreItem>
 </file>
 
-<file path=customXml/itemProps1.xml><?xml version="1.0" encoding="utf-8"?>
+<file path=customXml/itemProps2.xml><?xml version="1.0" encoding="utf-8"?>
 <ds:datastoreItem xmlns:ds="http://schemas.openxmlformats.org/officeDocument/2006/customXml" ds:itemID="{B64A4C9D-F801-4923-BC6D-E0006F512331}">
   <ds:schemaRefs>
     <ds:schemaRef ds:uri="http://schemas.microsoft.com/office/2006/metadata/contentType"/>
@@ -18702,22 +18785,4 @@
     <ds:schemaRef ds:uri="http://schemas.microsoft.com/internal/obd"/>
   </ds:schemaRefs>
 </ds:datastoreItem>
-</file>
-
-<file path=customXml/itemProps2.xml><?xml version="1.0" encoding="utf-8"?>
-<ds:datastoreItem xmlns:ds="http://schemas.openxmlformats.org/officeDocument/2006/customXml" ds:itemID="{EB2218FC-8412-44B9-9E82-D51F1F531141}">
-  <ds:schemaRefs>
-    <ds:schemaRef ds:uri="http://purl.org/dc/dcmitype/"/>
-    <ds:schemaRef ds:uri="6dc4bcd6-49db-4c07-9060-8acfc67cef9f"/>
-    <ds:schemaRef ds:uri="http://schemas.microsoft.com/office/2006/metadata/properties"/>
-    <ds:schemaRef ds:uri="http://schemas.microsoft.com/office/2006/documentManagement/types"/>
-    <ds:schemaRef ds:uri="http://schemas.microsoft.com/sharepoint/v3"/>
-    <ds:schemaRef ds:uri="http://www.w3.org/XML/1998/namespace"/>
-    <ds:schemaRef ds:uri="http://schemas.microsoft.com/office/infopath/2007/PartnerControls"/>
-    <ds:schemaRef ds:uri="http://purl.org/dc/elements/1.1/"/>
-    <ds:schemaRef ds:uri="http://schemas.openxmlformats.org/package/2006/metadata/core-properties"/>
-    <ds:schemaRef ds:uri="fb0879af-3eba-417a-a55a-ffe6dcd6ca77"/>
-    <ds:schemaRef ds:uri="http://purl.org/dc/terms/"/>
-  </ds:schemaRefs>
-</ds:datastoreItem>
 </file>
</xml_diff>

<commit_message>
Add integration test for CRUD and URLS
</commit_message>
<xml_diff>
--- a/Présentation de slides.pptx
+++ b/Présentation de slides.pptx
@@ -143,7 +143,7 @@
   <pc:docChgLst>
     <pc:chgData name="Quentin Beraud" userId="6a419fc9c26811ab" providerId="LiveId" clId="{3F3CC9DC-DBBB-44EF-8315-E9D08EE2DA56}"/>
     <pc:docChg chg="undo redo custSel addSld delSld modSld">
-      <pc:chgData name="Quentin Beraud" userId="6a419fc9c26811ab" providerId="LiveId" clId="{3F3CC9DC-DBBB-44EF-8315-E9D08EE2DA56}" dt="2023-09-12T08:17:15.737" v="2628" actId="20577"/>
+      <pc:chgData name="Quentin Beraud" userId="6a419fc9c26811ab" providerId="LiveId" clId="{3F3CC9DC-DBBB-44EF-8315-E9D08EE2DA56}" dt="2023-09-25T10:08:52.685" v="2752" actId="20577"/>
       <pc:docMkLst>
         <pc:docMk/>
       </pc:docMkLst>
@@ -163,13 +163,13 @@
         </pc:spChg>
       </pc:sldChg>
       <pc:sldChg chg="modSp mod">
-        <pc:chgData name="Quentin Beraud" userId="6a419fc9c26811ab" providerId="LiveId" clId="{3F3CC9DC-DBBB-44EF-8315-E9D08EE2DA56}" dt="2023-09-12T08:08:05.697" v="1870" actId="12"/>
+        <pc:chgData name="Quentin Beraud" userId="6a419fc9c26811ab" providerId="LiveId" clId="{3F3CC9DC-DBBB-44EF-8315-E9D08EE2DA56}" dt="2023-09-25T10:08:52.685" v="2752" actId="20577"/>
         <pc:sldMkLst>
           <pc:docMk/>
           <pc:sldMk cId="3188837873" sldId="284"/>
         </pc:sldMkLst>
         <pc:spChg chg="mod">
-          <ac:chgData name="Quentin Beraud" userId="6a419fc9c26811ab" providerId="LiveId" clId="{3F3CC9DC-DBBB-44EF-8315-E9D08EE2DA56}" dt="2023-09-12T08:08:05.697" v="1870" actId="12"/>
+          <ac:chgData name="Quentin Beraud" userId="6a419fc9c26811ab" providerId="LiveId" clId="{3F3CC9DC-DBBB-44EF-8315-E9D08EE2DA56}" dt="2023-09-25T10:08:52.685" v="2752" actId="20577"/>
           <ac:spMkLst>
             <pc:docMk/>
             <pc:sldMk cId="3188837873" sldId="284"/>
@@ -208,7 +208,7 @@
         </pc:spChg>
       </pc:sldChg>
       <pc:sldChg chg="addSp delSp modSp mod">
-        <pc:chgData name="Quentin Beraud" userId="6a419fc9c26811ab" providerId="LiveId" clId="{3F3CC9DC-DBBB-44EF-8315-E9D08EE2DA56}" dt="2023-09-12T07:29:37.628" v="87" actId="1076"/>
+        <pc:chgData name="Quentin Beraud" userId="6a419fc9c26811ab" providerId="LiveId" clId="{3F3CC9DC-DBBB-44EF-8315-E9D08EE2DA56}" dt="2023-09-25T10:07:51.810" v="2660" actId="1076"/>
         <pc:sldMkLst>
           <pc:docMk/>
           <pc:sldMk cId="2795806566" sldId="317"/>
@@ -221,12 +221,20 @@
             <ac:spMk id="13" creationId="{601856F3-405B-C8B6-A9C1-ECF7A771F398}"/>
           </ac:spMkLst>
         </pc:spChg>
-        <pc:picChg chg="add mod modCrop">
-          <ac:chgData name="Quentin Beraud" userId="6a419fc9c26811ab" providerId="LiveId" clId="{3F3CC9DC-DBBB-44EF-8315-E9D08EE2DA56}" dt="2023-09-12T07:29:26.853" v="86" actId="732"/>
+        <pc:picChg chg="add del mod modCrop">
+          <ac:chgData name="Quentin Beraud" userId="6a419fc9c26811ab" providerId="LiveId" clId="{3F3CC9DC-DBBB-44EF-8315-E9D08EE2DA56}" dt="2023-09-25T10:07:45.671" v="2658" actId="478"/>
           <ac:picMkLst>
             <pc:docMk/>
             <pc:sldMk cId="2795806566" sldId="317"/>
             <ac:picMk id="6" creationId="{2D5583A2-6139-091B-ED6F-D6F51C49CFDE}"/>
+          </ac:picMkLst>
+        </pc:picChg>
+        <pc:picChg chg="add mod">
+          <ac:chgData name="Quentin Beraud" userId="6a419fc9c26811ab" providerId="LiveId" clId="{3F3CC9DC-DBBB-44EF-8315-E9D08EE2DA56}" dt="2023-09-25T10:07:51.810" v="2660" actId="1076"/>
+          <ac:picMkLst>
+            <pc:docMk/>
+            <pc:sldMk cId="2795806566" sldId="317"/>
+            <ac:picMk id="11" creationId="{4A06937D-26C7-E796-CC30-65DCC298E462}"/>
           </ac:picMkLst>
         </pc:picChg>
         <pc:picChg chg="del">
@@ -4886,7 +4894,7 @@
             <a:pPr rtl="0"/>
             <a:fld id="{EBB651C5-239C-481D-B679-C1853F3D7869}" type="datetime1">
               <a:rPr lang="fr-FR" smtClean="0"/>
-              <a:t>12/09/2023</a:t>
+              <a:t>25/09/2023</a:t>
             </a:fld>
             <a:endParaRPr lang="fr-FR" dirty="0"/>
           </a:p>
@@ -5067,7 +5075,7 @@
             <a:fld id="{0CC3F468-A24C-40BA-9BA0-927B9D8CEF08}" type="datetime1">
               <a:rPr lang="fr-FR" smtClean="0"/>
               <a:pPr/>
-              <a:t>12/09/2023</a:t>
+              <a:t>25/09/2023</a:t>
             </a:fld>
             <a:endParaRPr lang="fr-FR" dirty="0"/>
           </a:p>
@@ -15179,7 +15187,7 @@
             </a:pPr>
             <a:r>
               <a:rPr lang="fr-FR" sz="1600" dirty="0"/>
-              <a:t>Implémentation du système de logs – Log avec </a:t>
+              <a:t>Implémentation du système de logs –</a:t>
             </a:r>
             <a:r>
               <a:rPr lang="fr-FR" dirty="0"/>
@@ -15191,7 +15199,7 @@
             </a:r>
             <a:r>
               <a:rPr lang="fr-FR" dirty="0"/>
-              <a:t>, génération de </a:t>
+              <a:t>, génération des logs sur un </a:t>
             </a:r>
             <a:r>
               <a:rPr lang="fr-FR" sz="1600" dirty="0"/>
@@ -15199,11 +15207,11 @@
             </a:r>
             <a:r>
               <a:rPr lang="fr-FR" dirty="0"/>
-              <a:t>plus via</a:t>
+              <a:t>et</a:t>
             </a:r>
             <a:r>
               <a:rPr lang="fr-FR" sz="1600" dirty="0"/>
-              <a:t> la console.</a:t>
+              <a:t> console.</a:t>
             </a:r>
           </a:p>
           <a:p>
@@ -15251,6 +15259,34 @@
               <a:rPr lang="fr-FR" sz="1600" dirty="0"/>
               <a:t>Mise en place d’une architecture MVC (Modèle – Vue – Contrôleur) et respect des principes SOLID.</a:t>
             </a:r>
+          </a:p>
+          <a:p>
+            <a:pPr marL="342900" lvl="1" indent="-342900">
+              <a:spcBef>
+                <a:spcPts val="0"/>
+              </a:spcBef>
+              <a:buFont typeface="+mj-lt"/>
+              <a:buAutoNum type="arabicPeriod"/>
+            </a:pPr>
+            <a:endParaRPr lang="fr-FR" dirty="0"/>
+          </a:p>
+          <a:p>
+            <a:pPr marL="342900" lvl="1" indent="-342900">
+              <a:spcBef>
+                <a:spcPts val="0"/>
+              </a:spcBef>
+              <a:buFont typeface="+mj-lt"/>
+              <a:buAutoNum type="arabicPeriod"/>
+            </a:pPr>
+            <a:r>
+              <a:rPr lang="fr-FR" sz="1600" dirty="0"/>
+              <a:t>Test d’intégration pour vérifier </a:t>
+            </a:r>
+            <a:r>
+              <a:rPr lang="fr-FR" sz="1600"/>
+              <a:t>les opérations CRUD et les URLS</a:t>
+            </a:r>
+            <a:endParaRPr lang="fr-FR" sz="1600" dirty="0"/>
           </a:p>
         </p:txBody>
       </p:sp>
@@ -18762,10 +18798,10 @@
       </p:pic>
       <p:pic>
         <p:nvPicPr>
-          <p:cNvPr id="6" name="Image 5">
+          <p:cNvPr id="11" name="Image 10">
             <a:extLst>
               <a:ext uri="{FF2B5EF4-FFF2-40B4-BE49-F238E27FC236}">
-                <a16:creationId xmlns:a16="http://schemas.microsoft.com/office/drawing/2014/main" id="{2D5583A2-6139-091B-ED6F-D6F51C49CFDE}"/>
+                <a16:creationId xmlns:a16="http://schemas.microsoft.com/office/drawing/2014/main" id="{4A06937D-26C7-E796-CC30-65DCC298E462}"/>
               </a:ext>
             </a:extLst>
           </p:cNvPr>
@@ -18774,15 +18810,16 @@
           </p:cNvPicPr>
           <p:nvPr/>
         </p:nvPicPr>
-        <p:blipFill rotWithShape="1">
+        <p:blipFill>
           <a:blip r:embed="rId4"/>
-          <a:srcRect t="11955" b="6962"/>
-          <a:stretch/>
+          <a:stretch>
+            <a:fillRect/>
+          </a:stretch>
         </p:blipFill>
         <p:spPr>
           <a:xfrm>
-            <a:off x="504825" y="2148388"/>
-            <a:ext cx="11182350" cy="2710828"/>
+            <a:off x="69034" y="2268118"/>
+            <a:ext cx="11944964" cy="2914800"/>
           </a:xfrm>
           <a:prstGeom prst="rect">
             <a:avLst/>

</xml_diff>